<commit_message>
Updated diagram [no ci]
</commit_message>
<xml_diff>
--- a/docsrc/AlarmProcessorDiagram.pptx
+++ b/docsrc/AlarmProcessorDiagram.pptx
@@ -260,7 +260,7 @@
           <a:p>
             <a:fld id="{44121C14-0BBC-B04F-BD49-98C362BE0BE3}" type="datetimeFigureOut">
               <a:rPr lang="en-US" smtClean="0"/>
-              <a:t>12/21/2021</a:t>
+              <a:t>6/27/2022</a:t>
             </a:fld>
             <a:endParaRPr lang="en-US"/>
           </a:p>
@@ -458,7 +458,7 @@
           <a:p>
             <a:fld id="{44121C14-0BBC-B04F-BD49-98C362BE0BE3}" type="datetimeFigureOut">
               <a:rPr lang="en-US" smtClean="0"/>
-              <a:t>12/21/2021</a:t>
+              <a:t>6/27/2022</a:t>
             </a:fld>
             <a:endParaRPr lang="en-US"/>
           </a:p>
@@ -666,7 +666,7 @@
           <a:p>
             <a:fld id="{44121C14-0BBC-B04F-BD49-98C362BE0BE3}" type="datetimeFigureOut">
               <a:rPr lang="en-US" smtClean="0"/>
-              <a:t>12/21/2021</a:t>
+              <a:t>6/27/2022</a:t>
             </a:fld>
             <a:endParaRPr lang="en-US"/>
           </a:p>
@@ -864,7 +864,7 @@
           <a:p>
             <a:fld id="{44121C14-0BBC-B04F-BD49-98C362BE0BE3}" type="datetimeFigureOut">
               <a:rPr lang="en-US" smtClean="0"/>
-              <a:t>12/21/2021</a:t>
+              <a:t>6/27/2022</a:t>
             </a:fld>
             <a:endParaRPr lang="en-US"/>
           </a:p>
@@ -1139,7 +1139,7 @@
           <a:p>
             <a:fld id="{44121C14-0BBC-B04F-BD49-98C362BE0BE3}" type="datetimeFigureOut">
               <a:rPr lang="en-US" smtClean="0"/>
-              <a:t>12/21/2021</a:t>
+              <a:t>6/27/2022</a:t>
             </a:fld>
             <a:endParaRPr lang="en-US"/>
           </a:p>
@@ -1404,7 +1404,7 @@
           <a:p>
             <a:fld id="{44121C14-0BBC-B04F-BD49-98C362BE0BE3}" type="datetimeFigureOut">
               <a:rPr lang="en-US" smtClean="0"/>
-              <a:t>12/21/2021</a:t>
+              <a:t>6/27/2022</a:t>
             </a:fld>
             <a:endParaRPr lang="en-US"/>
           </a:p>
@@ -1816,7 +1816,7 @@
           <a:p>
             <a:fld id="{44121C14-0BBC-B04F-BD49-98C362BE0BE3}" type="datetimeFigureOut">
               <a:rPr lang="en-US" smtClean="0"/>
-              <a:t>12/21/2021</a:t>
+              <a:t>6/27/2022</a:t>
             </a:fld>
             <a:endParaRPr lang="en-US"/>
           </a:p>
@@ -1957,7 +1957,7 @@
           <a:p>
             <a:fld id="{44121C14-0BBC-B04F-BD49-98C362BE0BE3}" type="datetimeFigureOut">
               <a:rPr lang="en-US" smtClean="0"/>
-              <a:t>12/21/2021</a:t>
+              <a:t>6/27/2022</a:t>
             </a:fld>
             <a:endParaRPr lang="en-US"/>
           </a:p>
@@ -2070,7 +2070,7 @@
           <a:p>
             <a:fld id="{44121C14-0BBC-B04F-BD49-98C362BE0BE3}" type="datetimeFigureOut">
               <a:rPr lang="en-US" smtClean="0"/>
-              <a:t>12/21/2021</a:t>
+              <a:t>6/27/2022</a:t>
             </a:fld>
             <a:endParaRPr lang="en-US"/>
           </a:p>
@@ -2381,7 +2381,7 @@
           <a:p>
             <a:fld id="{44121C14-0BBC-B04F-BD49-98C362BE0BE3}" type="datetimeFigureOut">
               <a:rPr lang="en-US" smtClean="0"/>
-              <a:t>12/21/2021</a:t>
+              <a:t>6/27/2022</a:t>
             </a:fld>
             <a:endParaRPr lang="en-US"/>
           </a:p>
@@ -2669,7 +2669,7 @@
           <a:p>
             <a:fld id="{44121C14-0BBC-B04F-BD49-98C362BE0BE3}" type="datetimeFigureOut">
               <a:rPr lang="en-US" smtClean="0"/>
-              <a:t>12/21/2021</a:t>
+              <a:t>6/27/2022</a:t>
             </a:fld>
             <a:endParaRPr lang="en-US"/>
           </a:p>
@@ -2910,7 +2910,7 @@
           <a:p>
             <a:fld id="{44121C14-0BBC-B04F-BD49-98C362BE0BE3}" type="datetimeFigureOut">
               <a:rPr lang="en-US" smtClean="0"/>
-              <a:t>12/21/2021</a:t>
+              <a:t>6/27/2022</a:t>
             </a:fld>
             <a:endParaRPr lang="en-US"/>
           </a:p>
@@ -3558,7 +3558,7 @@
                 <a:pPr algn="ctr"/>
                 <a:r>
                   <a:rPr lang="en-US" dirty="0"/>
-                  <a:t>Effective Activations</a:t>
+                  <a:t>Effective Notifications</a:t>
                 </a:r>
               </a:p>
             </p:txBody>

</xml_diff>